<commit_message>
Update workflow schema + plots
</commit_message>
<xml_diff>
--- a/other/workflow.pptx
+++ b/other/workflow.pptx
@@ -3223,7 +3223,7 @@
                     <a:schemeClr val="bg1"/>
                   </a:solidFill>
                 </a:rPr>
-                <a:t>Review</a:t>
+                <a:t>Labeling</a:t>
               </a:r>
               <a:endParaRPr lang="fr-CH" sz="2800" b="1" dirty="0">
                 <a:solidFill>
@@ -3384,147 +3384,6 @@
         </p:pic>
         <p:pic>
           <p:nvPicPr>
-            <p:cNvPr id="10" name="Picture 9" descr="napari · GitHub">
-              <a:extLst>
-                <a:ext uri="{FF2B5EF4-FFF2-40B4-BE49-F238E27FC236}">
-                  <a16:creationId xmlns:a16="http://schemas.microsoft.com/office/drawing/2014/main" id="{A149C26E-3841-D83F-EBE7-F005875DF2EA}"/>
-                </a:ext>
-              </a:extLst>
-            </p:cNvPr>
-            <p:cNvPicPr>
-              <a:picLocks noChangeAspect="1" noChangeArrowheads="1"/>
-            </p:cNvPicPr>
-            <p:nvPr/>
-          </p:nvPicPr>
-          <p:blipFill>
-            <a:blip r:embed="rId6">
-              <a:extLst>
-                <a:ext uri="{28A0092B-C50C-407E-A947-70E740481C1C}">
-                  <a14:useLocalDpi xmlns:a14="http://schemas.microsoft.com/office/drawing/2010/main" val="0"/>
-                </a:ext>
-              </a:extLst>
-            </a:blip>
-            <a:srcRect/>
-            <a:stretch>
-              <a:fillRect/>
-            </a:stretch>
-          </p:blipFill>
-          <p:spPr bwMode="auto">
-            <a:xfrm>
-              <a:off x="10502026" y="6195391"/>
-              <a:ext cx="201215" cy="201215"/>
-            </a:xfrm>
-            <a:prstGeom prst="rect">
-              <a:avLst/>
-            </a:prstGeom>
-            <a:noFill/>
-            <a:extLst>
-              <a:ext uri="{909E8E84-426E-40DD-AFC4-6F175D3DCCD1}">
-                <a14:hiddenFill xmlns:a14="http://schemas.microsoft.com/office/drawing/2010/main">
-                  <a:solidFill>
-                    <a:srgbClr val="FFFFFF"/>
-                  </a:solidFill>
-                </a14:hiddenFill>
-              </a:ext>
-            </a:extLst>
-          </p:spPr>
-        </p:pic>
-        <p:pic>
-          <p:nvPicPr>
-            <p:cNvPr id="26" name="Picture 25" descr="napari · GitHub">
-              <a:extLst>
-                <a:ext uri="{FF2B5EF4-FFF2-40B4-BE49-F238E27FC236}">
-                  <a16:creationId xmlns:a16="http://schemas.microsoft.com/office/drawing/2014/main" id="{3D9F745B-C776-733A-89AC-66D6048DD700}"/>
-                </a:ext>
-              </a:extLst>
-            </p:cNvPr>
-            <p:cNvPicPr>
-              <a:picLocks noChangeAspect="1" noChangeArrowheads="1"/>
-            </p:cNvPicPr>
-            <p:nvPr/>
-          </p:nvPicPr>
-          <p:blipFill>
-            <a:blip r:embed="rId6">
-              <a:extLst>
-                <a:ext uri="{28A0092B-C50C-407E-A947-70E740481C1C}">
-                  <a14:useLocalDpi xmlns:a14="http://schemas.microsoft.com/office/drawing/2010/main" val="0"/>
-                </a:ext>
-              </a:extLst>
-            </a:blip>
-            <a:srcRect/>
-            <a:stretch>
-              <a:fillRect/>
-            </a:stretch>
-          </p:blipFill>
-          <p:spPr bwMode="auto">
-            <a:xfrm>
-              <a:off x="12349836" y="5859434"/>
-              <a:ext cx="261990" cy="261990"/>
-            </a:xfrm>
-            <a:prstGeom prst="rect">
-              <a:avLst/>
-            </a:prstGeom>
-            <a:noFill/>
-            <a:extLst>
-              <a:ext uri="{909E8E84-426E-40DD-AFC4-6F175D3DCCD1}">
-                <a14:hiddenFill xmlns:a14="http://schemas.microsoft.com/office/drawing/2010/main">
-                  <a:solidFill>
-                    <a:srgbClr val="FFFFFF"/>
-                  </a:solidFill>
-                </a14:hiddenFill>
-              </a:ext>
-            </a:extLst>
-          </p:spPr>
-        </p:pic>
-        <p:pic>
-          <p:nvPicPr>
-            <p:cNvPr id="27" name="Picture 26" descr="napari · GitHub">
-              <a:extLst>
-                <a:ext uri="{FF2B5EF4-FFF2-40B4-BE49-F238E27FC236}">
-                  <a16:creationId xmlns:a16="http://schemas.microsoft.com/office/drawing/2014/main" id="{94A4C56E-A731-DBE0-45E9-929A01E9652C}"/>
-                </a:ext>
-              </a:extLst>
-            </p:cNvPr>
-            <p:cNvPicPr>
-              <a:picLocks noChangeAspect="1" noChangeArrowheads="1"/>
-            </p:cNvPicPr>
-            <p:nvPr/>
-          </p:nvPicPr>
-          <p:blipFill>
-            <a:blip r:embed="rId6">
-              <a:extLst>
-                <a:ext uri="{28A0092B-C50C-407E-A947-70E740481C1C}">
-                  <a14:useLocalDpi xmlns:a14="http://schemas.microsoft.com/office/drawing/2010/main" val="0"/>
-                </a:ext>
-              </a:extLst>
-            </a:blip>
-            <a:srcRect/>
-            <a:stretch>
-              <a:fillRect/>
-            </a:stretch>
-          </p:blipFill>
-          <p:spPr bwMode="auto">
-            <a:xfrm>
-              <a:off x="15757778" y="5661832"/>
-              <a:ext cx="295120" cy="295120"/>
-            </a:xfrm>
-            <a:prstGeom prst="rect">
-              <a:avLst/>
-            </a:prstGeom>
-            <a:noFill/>
-            <a:extLst>
-              <a:ext uri="{909E8E84-426E-40DD-AFC4-6F175D3DCCD1}">
-                <a14:hiddenFill xmlns:a14="http://schemas.microsoft.com/office/drawing/2010/main">
-                  <a:solidFill>
-                    <a:srgbClr val="FFFFFF"/>
-                  </a:solidFill>
-                </a14:hiddenFill>
-              </a:ext>
-            </a:extLst>
-          </p:spPr>
-        </p:pic>
-        <p:pic>
-          <p:nvPicPr>
             <p:cNvPr id="31" name="Graphic 30" descr="Magnifying glass with solid fill">
               <a:extLst>
                 <a:ext uri="{FF2B5EF4-FFF2-40B4-BE49-F238E27FC236}">
@@ -3538,13 +3397,13 @@
             <p:nvPr/>
           </p:nvPicPr>
           <p:blipFill>
-            <a:blip r:embed="rId7">
+            <a:blip r:embed="rId6">
               <a:extLst>
                 <a:ext uri="{28A0092B-C50C-407E-A947-70E740481C1C}">
                   <a14:useLocalDpi xmlns:a14="http://schemas.microsoft.com/office/drawing/2010/main" val="0"/>
                 </a:ext>
                 <a:ext uri="{96DAC541-7B7A-43D3-8B79-37D633B846F1}">
-                  <asvg:svgBlip xmlns:asvg="http://schemas.microsoft.com/office/drawing/2016/SVG/main" r:embed="rId8"/>
+                  <asvg:svgBlip xmlns:asvg="http://schemas.microsoft.com/office/drawing/2016/SVG/main" r:embed="rId7"/>
                 </a:ext>
               </a:extLst>
             </a:blip>
@@ -3692,7 +3551,7 @@
                   <a:schemeClr val="bg1"/>
                 </a:solidFill>
               </a:rPr>
-              <a:t>Review</a:t>
+              <a:t>Labeling</a:t>
             </a:r>
             <a:endParaRPr lang="fr-CH" sz="2800" b="1" dirty="0">
               <a:solidFill>
@@ -4284,13 +4143,13 @@
           <p:nvPr/>
         </p:nvPicPr>
         <p:blipFill>
-          <a:blip r:embed="rId7">
+          <a:blip r:embed="rId6">
             <a:extLst>
               <a:ext uri="{28A0092B-C50C-407E-A947-70E740481C1C}">
                 <a14:useLocalDpi xmlns:a14="http://schemas.microsoft.com/office/drawing/2010/main" val="0"/>
               </a:ext>
               <a:ext uri="{96DAC541-7B7A-43D3-8B79-37D633B846F1}">
-                <asvg:svgBlip xmlns:asvg="http://schemas.microsoft.com/office/drawing/2016/SVG/main" r:embed="rId8"/>
+                <asvg:svgBlip xmlns:asvg="http://schemas.microsoft.com/office/drawing/2016/SVG/main" r:embed="rId7"/>
               </a:ext>
             </a:extLst>
           </a:blip>
@@ -4509,98 +4368,6 @@
             </a:p>
           </p:txBody>
         </p:sp>
-        <p:pic>
-          <p:nvPicPr>
-            <p:cNvPr id="1028" name="Picture 4">
-              <a:extLst>
-                <a:ext uri="{FF2B5EF4-FFF2-40B4-BE49-F238E27FC236}">
-                  <a16:creationId xmlns:a16="http://schemas.microsoft.com/office/drawing/2014/main" id="{239E0D93-BA12-C59D-00C7-D108F205EC58}"/>
-                </a:ext>
-              </a:extLst>
-            </p:cNvPr>
-            <p:cNvPicPr>
-              <a:picLocks noChangeAspect="1" noChangeArrowheads="1"/>
-            </p:cNvPicPr>
-            <p:nvPr/>
-          </p:nvPicPr>
-          <p:blipFill rotWithShape="1">
-            <a:blip r:embed="rId9">
-              <a:extLst>
-                <a:ext uri="{28A0092B-C50C-407E-A947-70E740481C1C}">
-                  <a14:useLocalDpi xmlns:a14="http://schemas.microsoft.com/office/drawing/2010/main" val="0"/>
-                </a:ext>
-              </a:extLst>
-            </a:blip>
-            <a:srcRect l="18322" t="19768" r="17808" b="16197"/>
-            <a:stretch/>
-          </p:blipFill>
-          <p:spPr bwMode="auto">
-            <a:xfrm>
-              <a:off x="7933564" y="5187172"/>
-              <a:ext cx="274515" cy="177372"/>
-            </a:xfrm>
-            <a:prstGeom prst="rect">
-              <a:avLst/>
-            </a:prstGeom>
-            <a:noFill/>
-            <a:extLst>
-              <a:ext uri="{909E8E84-426E-40DD-AFC4-6F175D3DCCD1}">
-                <a14:hiddenFill xmlns:a14="http://schemas.microsoft.com/office/drawing/2010/main">
-                  <a:solidFill>
-                    <a:srgbClr val="FFFFFF"/>
-                  </a:solidFill>
-                </a14:hiddenFill>
-              </a:ext>
-            </a:extLst>
-          </p:spPr>
-        </p:pic>
-        <p:pic>
-          <p:nvPicPr>
-            <p:cNvPr id="1234" name="Picture 8" descr="napari · GitHub">
-              <a:extLst>
-                <a:ext uri="{FF2B5EF4-FFF2-40B4-BE49-F238E27FC236}">
-                  <a16:creationId xmlns:a16="http://schemas.microsoft.com/office/drawing/2014/main" id="{67AA0CA8-9EF0-BB38-8920-93AB3346C7C6}"/>
-                </a:ext>
-              </a:extLst>
-            </p:cNvPr>
-            <p:cNvPicPr>
-              <a:picLocks noChangeAspect="1" noChangeArrowheads="1"/>
-            </p:cNvPicPr>
-            <p:nvPr/>
-          </p:nvPicPr>
-          <p:blipFill>
-            <a:blip r:embed="rId6">
-              <a:extLst>
-                <a:ext uri="{28A0092B-C50C-407E-A947-70E740481C1C}">
-                  <a14:useLocalDpi xmlns:a14="http://schemas.microsoft.com/office/drawing/2010/main" val="0"/>
-                </a:ext>
-              </a:extLst>
-            </a:blip>
-            <a:srcRect/>
-            <a:stretch>
-              <a:fillRect/>
-            </a:stretch>
-          </p:blipFill>
-          <p:spPr bwMode="auto">
-            <a:xfrm>
-              <a:off x="8292249" y="5163332"/>
-              <a:ext cx="201215" cy="201215"/>
-            </a:xfrm>
-            <a:prstGeom prst="rect">
-              <a:avLst/>
-            </a:prstGeom>
-            <a:noFill/>
-            <a:extLst>
-              <a:ext uri="{909E8E84-426E-40DD-AFC4-6F175D3DCCD1}">
-                <a14:hiddenFill xmlns:a14="http://schemas.microsoft.com/office/drawing/2010/main">
-                  <a:solidFill>
-                    <a:srgbClr val="FFFFFF"/>
-                  </a:solidFill>
-                </a14:hiddenFill>
-              </a:ext>
-            </a:extLst>
-          </p:spPr>
-        </p:pic>
         <p:cxnSp>
           <p:nvCxnSpPr>
             <p:cNvPr id="1236" name="Straight Connector 1235">
@@ -4659,13 +4426,13 @@
             <p:nvPr/>
           </p:nvPicPr>
           <p:blipFill>
-            <a:blip r:embed="rId10">
+            <a:blip r:embed="rId8">
               <a:extLst>
                 <a:ext uri="{28A0092B-C50C-407E-A947-70E740481C1C}">
                   <a14:useLocalDpi xmlns:a14="http://schemas.microsoft.com/office/drawing/2010/main" val="0"/>
                 </a:ext>
                 <a:ext uri="{96DAC541-7B7A-43D3-8B79-37D633B846F1}">
-                  <asvg:svgBlip xmlns:asvg="http://schemas.microsoft.com/office/drawing/2016/SVG/main" r:embed="rId11"/>
+                  <asvg:svgBlip xmlns:asvg="http://schemas.microsoft.com/office/drawing/2016/SVG/main" r:embed="rId9"/>
                 </a:ext>
               </a:extLst>
             </a:blip>
@@ -4684,54 +4451,6 @@
           </p:spPr>
         </p:pic>
       </p:grpSp>
-      <p:pic>
-        <p:nvPicPr>
-          <p:cNvPr id="9" name="Picture 8" descr="napari · GitHub">
-            <a:extLst>
-              <a:ext uri="{FF2B5EF4-FFF2-40B4-BE49-F238E27FC236}">
-                <a16:creationId xmlns:a16="http://schemas.microsoft.com/office/drawing/2014/main" id="{8B680CFA-927B-8656-8DC2-84DB037103F3}"/>
-              </a:ext>
-            </a:extLst>
-          </p:cNvPr>
-          <p:cNvPicPr>
-            <a:picLocks noChangeAspect="1" noChangeArrowheads="1"/>
-          </p:cNvPicPr>
-          <p:nvPr/>
-        </p:nvPicPr>
-        <p:blipFill>
-          <a:blip r:embed="rId6">
-            <a:extLst>
-              <a:ext uri="{28A0092B-C50C-407E-A947-70E740481C1C}">
-                <a14:useLocalDpi xmlns:a14="http://schemas.microsoft.com/office/drawing/2010/main" val="0"/>
-              </a:ext>
-            </a:extLst>
-          </a:blip>
-          <a:srcRect/>
-          <a:stretch>
-            <a:fillRect/>
-          </a:stretch>
-        </p:blipFill>
-        <p:spPr bwMode="auto">
-          <a:xfrm>
-            <a:off x="5944099" y="2373123"/>
-            <a:ext cx="325837" cy="325837"/>
-          </a:xfrm>
-          <a:prstGeom prst="rect">
-            <a:avLst/>
-          </a:prstGeom>
-          <a:noFill/>
-          <a:effectLst/>
-          <a:extLst>
-            <a:ext uri="{909E8E84-426E-40DD-AFC4-6F175D3DCCD1}">
-              <a14:hiddenFill xmlns:a14="http://schemas.microsoft.com/office/drawing/2010/main">
-                <a:solidFill>
-                  <a:srgbClr val="FFFFFF"/>
-                </a:solidFill>
-              </a14:hiddenFill>
-            </a:ext>
-          </a:extLst>
-        </p:spPr>
-      </p:pic>
       <p:cxnSp>
         <p:nvCxnSpPr>
           <p:cNvPr id="29" name="Straight Arrow Connector 28">
@@ -4797,7 +4516,7 @@
           <p:nvPr/>
         </p:nvPicPr>
         <p:blipFill rotWithShape="1">
-          <a:blip r:embed="rId9">
+          <a:blip r:embed="rId10">
             <a:extLst>
               <a:ext uri="{28A0092B-C50C-407E-A947-70E740481C1C}">
                 <a14:useLocalDpi xmlns:a14="http://schemas.microsoft.com/office/drawing/2010/main" val="0"/>
@@ -4842,7 +4561,7 @@
           <p:nvPr/>
         </p:nvPicPr>
         <p:blipFill>
-          <a:blip r:embed="rId6">
+          <a:blip r:embed="rId11">
             <a:extLst>
               <a:ext uri="{28A0092B-C50C-407E-A947-70E740481C1C}">
                 <a14:useLocalDpi xmlns:a14="http://schemas.microsoft.com/office/drawing/2010/main" val="0"/>

</xml_diff>